<commit_message>
Added github repository link to presentation
</commit_message>
<xml_diff>
--- a/Final Project Slides.pptx
+++ b/Final Project Slides.pptx
@@ -5,7 +5,7 @@
     <p:sldMasterId id="2147483659" r:id="rId1"/>
   </p:sldMasterIdLst>
   <p:notesMasterIdLst>
-    <p:notesMasterId r:id="rId11"/>
+    <p:notesMasterId r:id="rId12"/>
   </p:notesMasterIdLst>
   <p:sldIdLst>
     <p:sldId id="256" r:id="rId2"/>
@@ -16,24 +16,25 @@
     <p:sldId id="261" r:id="rId7"/>
     <p:sldId id="262" r:id="rId8"/>
     <p:sldId id="263" r:id="rId9"/>
-    <p:sldId id="264" r:id="rId10"/>
+    <p:sldId id="265" r:id="rId10"/>
+    <p:sldId id="264" r:id="rId11"/>
   </p:sldIdLst>
   <p:sldSz cx="9144000" cy="5143500" type="screen16x9"/>
   <p:notesSz cx="6858000" cy="9144000"/>
   <p:embeddedFontLst>
     <p:embeddedFont>
       <p:font typeface="Economica" panose="020B0604020202020204" charset="0"/>
-      <p:regular r:id="rId12"/>
-      <p:bold r:id="rId13"/>
-      <p:italic r:id="rId14"/>
-      <p:boldItalic r:id="rId15"/>
+      <p:regular r:id="rId13"/>
+      <p:bold r:id="rId14"/>
+      <p:italic r:id="rId15"/>
+      <p:boldItalic r:id="rId16"/>
     </p:embeddedFont>
     <p:embeddedFont>
       <p:font typeface="Open Sans" panose="020B0606030504020204" pitchFamily="34" charset="0"/>
-      <p:regular r:id="rId16"/>
-      <p:bold r:id="rId17"/>
-      <p:italic r:id="rId18"/>
-      <p:boldItalic r:id="rId19"/>
+      <p:regular r:id="rId17"/>
+      <p:bold r:id="rId18"/>
+      <p:italic r:id="rId19"/>
+      <p:boldItalic r:id="rId20"/>
     </p:embeddedFont>
   </p:embeddedFontLst>
   <p:defaultTextStyle>
@@ -7342,6 +7343,81 @@
 </p:sld>
 </file>
 
+<file path=ppt/slides/slide10.xml><?xml version="1.0" encoding="utf-8"?>
+<p:sld xmlns:a="http://schemas.openxmlformats.org/drawingml/2006/main" xmlns:r="http://schemas.openxmlformats.org/officeDocument/2006/relationships" xmlns:p="http://schemas.openxmlformats.org/presentationml/2006/main">
+  <p:cSld>
+    <p:spTree>
+      <p:nvGrpSpPr>
+        <p:cNvPr id="1" name="Shape 124"/>
+        <p:cNvGrpSpPr/>
+        <p:nvPr/>
+      </p:nvGrpSpPr>
+      <p:grpSpPr>
+        <a:xfrm>
+          <a:off x="0" y="0"/>
+          <a:ext cx="0" cy="0"/>
+          <a:chOff x="0" y="0"/>
+          <a:chExt cx="0" cy="0"/>
+        </a:xfrm>
+      </p:grpSpPr>
+      <p:sp>
+        <p:nvSpPr>
+          <p:cNvPr id="125" name="Google Shape;125;p21"/>
+          <p:cNvSpPr txBox="1">
+            <a:spLocks noGrp="1"/>
+          </p:cNvSpPr>
+          <p:nvPr>
+            <p:ph type="body" idx="1"/>
+          </p:nvPr>
+        </p:nvSpPr>
+        <p:spPr>
+          <a:xfrm>
+            <a:off x="2491050" y="1942650"/>
+            <a:ext cx="4161900" cy="1258200"/>
+          </a:xfrm>
+          <a:prstGeom prst="rect">
+            <a:avLst/>
+          </a:prstGeom>
+        </p:spPr>
+        <p:txBody>
+          <a:bodyPr spcFirstLastPara="1" wrap="square" lIns="91425" tIns="91425" rIns="91425" bIns="91425" anchor="t" anchorCtr="0">
+            <a:normAutofit/>
+          </a:bodyPr>
+          <a:lstStyle/>
+          <a:p>
+            <a:pPr marL="0" lvl="0" indent="0" algn="l" rtl="0">
+              <a:spcBef>
+                <a:spcPts val="0"/>
+              </a:spcBef>
+              <a:spcAft>
+                <a:spcPts val="1200"/>
+              </a:spcAft>
+              <a:buNone/>
+            </a:pPr>
+            <a:r>
+              <a:rPr lang="en" sz="6000">
+                <a:solidFill>
+                  <a:schemeClr val="lt2"/>
+                </a:solidFill>
+              </a:rPr>
+              <a:t>Questions?</a:t>
+            </a:r>
+            <a:endParaRPr sz="6000">
+              <a:solidFill>
+                <a:schemeClr val="lt2"/>
+              </a:solidFill>
+            </a:endParaRPr>
+          </a:p>
+        </p:txBody>
+      </p:sp>
+    </p:spTree>
+  </p:cSld>
+  <p:clrMapOvr>
+    <a:masterClrMapping/>
+  </p:clrMapOvr>
+</p:sld>
+</file>
+
 <file path=ppt/slides/slide2.xml><?xml version="1.0" encoding="utf-8"?>
 <p:sld xmlns:a="http://schemas.openxmlformats.org/drawingml/2006/main" xmlns:r="http://schemas.openxmlformats.org/officeDocument/2006/relationships" xmlns:p="http://schemas.openxmlformats.org/presentationml/2006/main">
   <p:cSld>
@@ -9483,7 +9559,7 @@
   <p:cSld>
     <p:spTree>
       <p:nvGrpSpPr>
-        <p:cNvPr id="1" name="Shape 124"/>
+        <p:cNvPr id="1" name=""/>
         <p:cNvGrpSpPr/>
         <p:nvPr/>
       </p:nvGrpSpPr>
@@ -9497,8 +9573,42 @@
       </p:grpSpPr>
       <p:sp>
         <p:nvSpPr>
-          <p:cNvPr id="125" name="Google Shape;125;p21"/>
-          <p:cNvSpPr txBox="1">
+          <p:cNvPr id="2" name="Title 1">
+            <a:extLst>
+              <a:ext uri="{FF2B5EF4-FFF2-40B4-BE49-F238E27FC236}">
+                <a16:creationId xmlns:a16="http://schemas.microsoft.com/office/drawing/2014/main" id="{26B5D5B3-0A66-445B-A018-261D9A06DF21}"/>
+              </a:ext>
+            </a:extLst>
+          </p:cNvPr>
+          <p:cNvSpPr>
+            <a:spLocks noGrp="1"/>
+          </p:cNvSpPr>
+          <p:nvPr>
+            <p:ph type="title"/>
+          </p:nvPr>
+        </p:nvSpPr>
+        <p:spPr/>
+        <p:txBody>
+          <a:bodyPr/>
+          <a:lstStyle/>
+          <a:p>
+            <a:r>
+              <a:rPr lang="en-US" dirty="0"/>
+              <a:t>GitHub Repository</a:t>
+            </a:r>
+          </a:p>
+        </p:txBody>
+      </p:sp>
+      <p:sp>
+        <p:nvSpPr>
+          <p:cNvPr id="3" name="Text Placeholder 2">
+            <a:extLst>
+              <a:ext uri="{FF2B5EF4-FFF2-40B4-BE49-F238E27FC236}">
+                <a16:creationId xmlns:a16="http://schemas.microsoft.com/office/drawing/2014/main" id="{3CB3B5E0-C490-4C8A-904A-52E6DB12771B}"/>
+              </a:ext>
+            </a:extLst>
+          </p:cNvPr>
+          <p:cNvSpPr>
             <a:spLocks noGrp="1"/>
           </p:cNvSpPr>
           <p:nvPr>
@@ -9507,45 +9617,34 @@
         </p:nvSpPr>
         <p:spPr>
           <a:xfrm>
-            <a:off x="2491050" y="1942650"/>
-            <a:ext cx="4161900" cy="1258200"/>
+            <a:off x="2314659" y="2311213"/>
+            <a:ext cx="4514682" cy="521073"/>
           </a:xfrm>
-          <a:prstGeom prst="rect">
-            <a:avLst/>
-          </a:prstGeom>
         </p:spPr>
         <p:txBody>
-          <a:bodyPr spcFirstLastPara="1" wrap="square" lIns="91425" tIns="91425" rIns="91425" bIns="91425" anchor="t" anchorCtr="0">
-            <a:normAutofit/>
-          </a:bodyPr>
+          <a:bodyPr/>
           <a:lstStyle/>
           <a:p>
-            <a:pPr marL="0" lvl="0" indent="0" algn="l" rtl="0">
-              <a:spcBef>
-                <a:spcPts val="0"/>
-              </a:spcBef>
-              <a:spcAft>
-                <a:spcPts val="1200"/>
-              </a:spcAft>
+            <a:pPr marL="114300" indent="0">
               <a:buNone/>
             </a:pPr>
             <a:r>
-              <a:rPr lang="en" sz="6000">
+              <a:rPr lang="en-US" dirty="0">
                 <a:solidFill>
-                  <a:schemeClr val="lt2"/>
+                  <a:schemeClr val="tx2"/>
                 </a:solidFill>
               </a:rPr>
-              <a:t>Questions?</a:t>
+              <a:t>https://github.com/dpendurthi/CS-3704</a:t>
             </a:r>
-            <a:endParaRPr sz="6000">
-              <a:solidFill>
-                <a:schemeClr val="lt2"/>
-              </a:solidFill>
-            </a:endParaRPr>
           </a:p>
         </p:txBody>
       </p:sp>
     </p:spTree>
+    <p:extLst>
+      <p:ext uri="{BB962C8B-B14F-4D97-AF65-F5344CB8AC3E}">
+        <p14:creationId xmlns:p14="http://schemas.microsoft.com/office/powerpoint/2010/main" val="1564929518"/>
+      </p:ext>
+    </p:extLst>
   </p:cSld>
   <p:clrMapOvr>
     <a:masterClrMapping/>

</xml_diff>